<commit_message>
some refinements and custom keymap
</commit_message>
<xml_diff>
--- a/src/docs/Demo.pptx
+++ b/src/docs/Demo.pptx
@@ -3176,7 +3176,7 @@
           <a:p>
             <a:fld id="{FA187C5E-F863-413E-862F-BC8733C9F1D4}" type="datetimeFigureOut">
               <a:rPr lang="de-DE" smtClean="0"/>
-              <a:t>02.09.2017</a:t>
+              <a:t>03.09.2017</a:t>
             </a:fld>
             <a:endParaRPr lang="de-DE"/>
           </a:p>
@@ -3532,6 +3532,25 @@
             </a:r>
           </a:p>
           <a:p>
+            <a:r>
+              <a:rPr lang="de-DE" dirty="0" err="1"/>
+              <a:t>include</a:t>
+            </a:r>
+            <a:r>
+              <a:rPr lang="de-DE"/>
+              <a:t>::../customKeymap</a:t>
+            </a:r>
+            <a:r>
+              <a:rPr lang="de-DE" dirty="0" err="1"/>
+              <a:t>.adoc</a:t>
+            </a:r>
+            <a:r>
+              <a:rPr lang="de-DE" dirty="0"/>
+              <a:t>[]</a:t>
+            </a:r>
+            <a:br>
+              <a:rPr lang="de-DE" dirty="0"/>
+            </a:br>
             <a:r>
               <a:rPr lang="de-DE" dirty="0"/>
               <a:t>[%</a:t>
@@ -5148,7 +5167,7 @@
           <a:p>
             <a:fld id="{649F32A6-21C7-473E-9542-64E26113B463}" type="datetimeFigureOut">
               <a:rPr lang="de-DE" smtClean="0"/>
-              <a:t>02.09.2017</a:t>
+              <a:t>03.09.2017</a:t>
             </a:fld>
             <a:endParaRPr lang="de-DE"/>
           </a:p>
@@ -5399,7 +5418,7 @@
           <a:p>
             <a:fld id="{649F32A6-21C7-473E-9542-64E26113B463}" type="datetimeFigureOut">
               <a:rPr lang="de-DE" smtClean="0"/>
-              <a:t>02.09.2017</a:t>
+              <a:t>03.09.2017</a:t>
             </a:fld>
             <a:endParaRPr lang="de-DE"/>
           </a:p>
@@ -5713,7 +5732,7 @@
           <a:p>
             <a:fld id="{649F32A6-21C7-473E-9542-64E26113B463}" type="datetimeFigureOut">
               <a:rPr lang="de-DE" smtClean="0"/>
-              <a:t>02.09.2017</a:t>
+              <a:t>03.09.2017</a:t>
             </a:fld>
             <a:endParaRPr lang="de-DE"/>
           </a:p>
@@ -6054,7 +6073,7 @@
           <a:p>
             <a:fld id="{649F32A6-21C7-473E-9542-64E26113B463}" type="datetimeFigureOut">
               <a:rPr lang="de-DE" smtClean="0"/>
-              <a:t>02.09.2017</a:t>
+              <a:t>03.09.2017</a:t>
             </a:fld>
             <a:endParaRPr lang="de-DE"/>
           </a:p>
@@ -6368,7 +6387,7 @@
           <a:p>
             <a:fld id="{649F32A6-21C7-473E-9542-64E26113B463}" type="datetimeFigureOut">
               <a:rPr lang="de-DE" smtClean="0"/>
-              <a:t>02.09.2017</a:t>
+              <a:t>03.09.2017</a:t>
             </a:fld>
             <a:endParaRPr lang="de-DE"/>
           </a:p>
@@ -6761,7 +6780,7 @@
           <a:p>
             <a:fld id="{649F32A6-21C7-473E-9542-64E26113B463}" type="datetimeFigureOut">
               <a:rPr lang="de-DE" smtClean="0"/>
-              <a:t>02.09.2017</a:t>
+              <a:t>03.09.2017</a:t>
             </a:fld>
             <a:endParaRPr lang="de-DE"/>
           </a:p>
@@ -6931,7 +6950,7 @@
           <a:p>
             <a:fld id="{649F32A6-21C7-473E-9542-64E26113B463}" type="datetimeFigureOut">
               <a:rPr lang="de-DE" smtClean="0"/>
-              <a:t>02.09.2017</a:t>
+              <a:t>03.09.2017</a:t>
             </a:fld>
             <a:endParaRPr lang="de-DE"/>
           </a:p>
@@ -7111,7 +7130,7 @@
           <a:p>
             <a:fld id="{649F32A6-21C7-473E-9542-64E26113B463}" type="datetimeFigureOut">
               <a:rPr lang="de-DE" smtClean="0"/>
-              <a:t>02.09.2017</a:t>
+              <a:t>03.09.2017</a:t>
             </a:fld>
             <a:endParaRPr lang="de-DE"/>
           </a:p>
@@ -7287,7 +7306,7 @@
           <a:p>
             <a:fld id="{649F32A6-21C7-473E-9542-64E26113B463}" type="datetimeFigureOut">
               <a:rPr lang="de-DE" smtClean="0"/>
-              <a:t>02.09.2017</a:t>
+              <a:t>03.09.2017</a:t>
             </a:fld>
             <a:endParaRPr lang="de-DE"/>
           </a:p>
@@ -7534,7 +7553,7 @@
           <a:p>
             <a:fld id="{649F32A6-21C7-473E-9542-64E26113B463}" type="datetimeFigureOut">
               <a:rPr lang="de-DE" smtClean="0"/>
-              <a:t>02.09.2017</a:t>
+              <a:t>03.09.2017</a:t>
             </a:fld>
             <a:endParaRPr lang="de-DE"/>
           </a:p>
@@ -7766,7 +7785,7 @@
           <a:p>
             <a:fld id="{649F32A6-21C7-473E-9542-64E26113B463}" type="datetimeFigureOut">
               <a:rPr lang="de-DE" smtClean="0"/>
-              <a:t>02.09.2017</a:t>
+              <a:t>03.09.2017</a:t>
             </a:fld>
             <a:endParaRPr lang="de-DE"/>
           </a:p>
@@ -8140,7 +8159,7 @@
           <a:p>
             <a:fld id="{649F32A6-21C7-473E-9542-64E26113B463}" type="datetimeFigureOut">
               <a:rPr lang="de-DE" smtClean="0"/>
-              <a:t>02.09.2017</a:t>
+              <a:t>03.09.2017</a:t>
             </a:fld>
             <a:endParaRPr lang="de-DE"/>
           </a:p>
@@ -8263,7 +8282,7 @@
           <a:p>
             <a:fld id="{649F32A6-21C7-473E-9542-64E26113B463}" type="datetimeFigureOut">
               <a:rPr lang="de-DE" smtClean="0"/>
-              <a:t>02.09.2017</a:t>
+              <a:t>03.09.2017</a:t>
             </a:fld>
             <a:endParaRPr lang="de-DE"/>
           </a:p>
@@ -8358,7 +8377,7 @@
           <a:p>
             <a:fld id="{649F32A6-21C7-473E-9542-64E26113B463}" type="datetimeFigureOut">
               <a:rPr lang="de-DE" smtClean="0"/>
-              <a:t>02.09.2017</a:t>
+              <a:t>03.09.2017</a:t>
             </a:fld>
             <a:endParaRPr lang="de-DE"/>
           </a:p>
@@ -8613,7 +8632,7 @@
           <a:p>
             <a:fld id="{649F32A6-21C7-473E-9542-64E26113B463}" type="datetimeFigureOut">
               <a:rPr lang="de-DE" smtClean="0"/>
-              <a:t>02.09.2017</a:t>
+              <a:t>03.09.2017</a:t>
             </a:fld>
             <a:endParaRPr lang="de-DE"/>
           </a:p>
@@ -8876,7 +8895,7 @@
           <a:p>
             <a:fld id="{649F32A6-21C7-473E-9542-64E26113B463}" type="datetimeFigureOut">
               <a:rPr lang="de-DE" smtClean="0"/>
-              <a:t>02.09.2017</a:t>
+              <a:t>03.09.2017</a:t>
             </a:fld>
             <a:endParaRPr lang="de-DE"/>
           </a:p>
@@ -9619,7 +9638,7 @@
           <a:p>
             <a:fld id="{649F32A6-21C7-473E-9542-64E26113B463}" type="datetimeFigureOut">
               <a:rPr lang="de-DE" smtClean="0"/>
-              <a:t>02.09.2017</a:t>
+              <a:t>03.09.2017</a:t>
             </a:fld>
             <a:endParaRPr lang="de-DE"/>
           </a:p>

</xml_diff>